<commit_message>
Change watermark command seq diagram ppt
</commit_message>
<xml_diff>
--- a/docs/images/WaterMarkCommandSequenceDiagram.pptx
+++ b/docs/images/WaterMarkCommandSequenceDiagram.pptx
@@ -197,7 +197,7 @@
           <a:p>
             <a:fld id="{36009D07-A97F-4DBD-BA38-EF5958A7A290}" type="datetimeFigureOut">
               <a:rPr lang="en-GB" smtClean="0"/>
-              <a:t>14/04/2019</a:t>
+              <a:t>15/04/2019</a:t>
             </a:fld>
             <a:endParaRPr lang="en-GB"/>
           </a:p>
@@ -696,7 +696,7 @@
           <a:p>
             <a:fld id="{A995DD06-FA5B-3C4A-9EC2-FFA80E37B40D}" type="datetimeFigureOut">
               <a:rPr lang="en-US" smtClean="0"/>
-              <a:t>4/14/2019</a:t>
+              <a:t>4/15/2019</a:t>
             </a:fld>
             <a:endParaRPr lang="en-US"/>
           </a:p>
@@ -894,7 +894,7 @@
           <a:p>
             <a:fld id="{A995DD06-FA5B-3C4A-9EC2-FFA80E37B40D}" type="datetimeFigureOut">
               <a:rPr lang="en-US" smtClean="0"/>
-              <a:t>4/14/2019</a:t>
+              <a:t>4/15/2019</a:t>
             </a:fld>
             <a:endParaRPr lang="en-US"/>
           </a:p>
@@ -1102,7 +1102,7 @@
           <a:p>
             <a:fld id="{A995DD06-FA5B-3C4A-9EC2-FFA80E37B40D}" type="datetimeFigureOut">
               <a:rPr lang="en-US" smtClean="0"/>
-              <a:t>4/14/2019</a:t>
+              <a:t>4/15/2019</a:t>
             </a:fld>
             <a:endParaRPr lang="en-US"/>
           </a:p>
@@ -1300,7 +1300,7 @@
           <a:p>
             <a:fld id="{A995DD06-FA5B-3C4A-9EC2-FFA80E37B40D}" type="datetimeFigureOut">
               <a:rPr lang="en-US" smtClean="0"/>
-              <a:t>4/14/2019</a:t>
+              <a:t>4/15/2019</a:t>
             </a:fld>
             <a:endParaRPr lang="en-US"/>
           </a:p>
@@ -1575,7 +1575,7 @@
           <a:p>
             <a:fld id="{A995DD06-FA5B-3C4A-9EC2-FFA80E37B40D}" type="datetimeFigureOut">
               <a:rPr lang="en-US" smtClean="0"/>
-              <a:t>4/14/2019</a:t>
+              <a:t>4/15/2019</a:t>
             </a:fld>
             <a:endParaRPr lang="en-US"/>
           </a:p>
@@ -1840,7 +1840,7 @@
           <a:p>
             <a:fld id="{A995DD06-FA5B-3C4A-9EC2-FFA80E37B40D}" type="datetimeFigureOut">
               <a:rPr lang="en-US" smtClean="0"/>
-              <a:t>4/14/2019</a:t>
+              <a:t>4/15/2019</a:t>
             </a:fld>
             <a:endParaRPr lang="en-US"/>
           </a:p>
@@ -2252,7 +2252,7 @@
           <a:p>
             <a:fld id="{A995DD06-FA5B-3C4A-9EC2-FFA80E37B40D}" type="datetimeFigureOut">
               <a:rPr lang="en-US" smtClean="0"/>
-              <a:t>4/14/2019</a:t>
+              <a:t>4/15/2019</a:t>
             </a:fld>
             <a:endParaRPr lang="en-US"/>
           </a:p>
@@ -2393,7 +2393,7 @@
           <a:p>
             <a:fld id="{A995DD06-FA5B-3C4A-9EC2-FFA80E37B40D}" type="datetimeFigureOut">
               <a:rPr lang="en-US" smtClean="0"/>
-              <a:t>4/14/2019</a:t>
+              <a:t>4/15/2019</a:t>
             </a:fld>
             <a:endParaRPr lang="en-US"/>
           </a:p>
@@ -2506,7 +2506,7 @@
           <a:p>
             <a:fld id="{A995DD06-FA5B-3C4A-9EC2-FFA80E37B40D}" type="datetimeFigureOut">
               <a:rPr lang="en-US" smtClean="0"/>
-              <a:t>4/14/2019</a:t>
+              <a:t>4/15/2019</a:t>
             </a:fld>
             <a:endParaRPr lang="en-US"/>
           </a:p>
@@ -2817,7 +2817,7 @@
           <a:p>
             <a:fld id="{A995DD06-FA5B-3C4A-9EC2-FFA80E37B40D}" type="datetimeFigureOut">
               <a:rPr lang="en-US" smtClean="0"/>
-              <a:t>4/14/2019</a:t>
+              <a:t>4/15/2019</a:t>
             </a:fld>
             <a:endParaRPr lang="en-US"/>
           </a:p>
@@ -3105,7 +3105,7 @@
           <a:p>
             <a:fld id="{A995DD06-FA5B-3C4A-9EC2-FFA80E37B40D}" type="datetimeFigureOut">
               <a:rPr lang="en-US" smtClean="0"/>
-              <a:t>4/14/2019</a:t>
+              <a:t>4/15/2019</a:t>
             </a:fld>
             <a:endParaRPr lang="en-US"/>
           </a:p>
@@ -3346,7 +3346,7 @@
           <a:p>
             <a:fld id="{A995DD06-FA5B-3C4A-9EC2-FFA80E37B40D}" type="datetimeFigureOut">
               <a:rPr lang="en-US" smtClean="0"/>
-              <a:t>4/14/2019</a:t>
+              <a:t>4/15/2019</a:t>
             </a:fld>
             <a:endParaRPr lang="en-US"/>
           </a:p>
@@ -7469,7 +7469,7 @@
         </p:nvSpPr>
         <p:spPr>
           <a:xfrm flipV="1">
-            <a:off x="5655109" y="4913590"/>
+            <a:off x="5655109" y="4869200"/>
             <a:ext cx="432450" cy="262304"/>
           </a:xfrm>
           <a:prstGeom prst="snip1Rect">
@@ -8591,6 +8591,195 @@
           </a:fontRef>
         </p:style>
       </p:cxnSp>
+      <p:sp>
+        <p:nvSpPr>
+          <p:cNvPr id="98" name="Rectangle 97">
+            <a:extLst>
+              <a:ext uri="{FF2B5EF4-FFF2-40B4-BE49-F238E27FC236}">
+                <a16:creationId xmlns:a16="http://schemas.microsoft.com/office/drawing/2014/main" id="{369221B1-7B45-4947-BD17-BC717B6B68E2}"/>
+              </a:ext>
+            </a:extLst>
+          </p:cNvPr>
+          <p:cNvSpPr/>
+          <p:nvPr/>
+        </p:nvSpPr>
+        <p:spPr>
+          <a:xfrm>
+            <a:off x="5150775" y="2196994"/>
+            <a:ext cx="6304683" cy="4793871"/>
+          </a:xfrm>
+          <a:prstGeom prst="rect">
+            <a:avLst/>
+          </a:prstGeom>
+          <a:noFill/>
+        </p:spPr>
+        <p:style>
+          <a:lnRef idx="2">
+            <a:schemeClr val="accent1">
+              <a:shade val="50000"/>
+            </a:schemeClr>
+          </a:lnRef>
+          <a:fillRef idx="1">
+            <a:schemeClr val="accent1"/>
+          </a:fillRef>
+          <a:effectRef idx="0">
+            <a:schemeClr val="accent1"/>
+          </a:effectRef>
+          <a:fontRef idx="minor">
+            <a:schemeClr val="lt1"/>
+          </a:fontRef>
+        </p:style>
+        <p:txBody>
+          <a:bodyPr rtlCol="0" anchor="ctr"/>
+          <a:lstStyle/>
+          <a:p>
+            <a:pPr algn="ctr"/>
+            <a:endParaRPr lang="en-SG"/>
+          </a:p>
+        </p:txBody>
+      </p:sp>
+      <p:sp>
+        <p:nvSpPr>
+          <p:cNvPr id="99" name="TextBox 98">
+            <a:extLst>
+              <a:ext uri="{FF2B5EF4-FFF2-40B4-BE49-F238E27FC236}">
+                <a16:creationId xmlns:a16="http://schemas.microsoft.com/office/drawing/2014/main" id="{17523E3E-410C-4B07-AC0D-49712DB33B7A}"/>
+              </a:ext>
+            </a:extLst>
+          </p:cNvPr>
+          <p:cNvSpPr txBox="1"/>
+          <p:nvPr/>
+        </p:nvSpPr>
+        <p:spPr>
+          <a:xfrm flipV="1">
+            <a:off x="5155118" y="2194298"/>
+            <a:ext cx="432450" cy="262304"/>
+          </a:xfrm>
+          <a:prstGeom prst="snip1Rect">
+            <a:avLst>
+              <a:gd name="adj" fmla="val 31429"/>
+            </a:avLst>
+          </a:prstGeom>
+          <a:noFill/>
+          <a:ln w="28575">
+            <a:solidFill>
+              <a:schemeClr val="tx2"/>
+            </a:solidFill>
+          </a:ln>
+        </p:spPr>
+        <p:txBody>
+          <a:bodyPr wrap="square" rtlCol="0">
+            <a:spAutoFit/>
+          </a:bodyPr>
+          <a:lstStyle/>
+          <a:p>
+            <a:endParaRPr lang="en-SG" sz="1200" dirty="0"/>
+          </a:p>
+        </p:txBody>
+      </p:sp>
+      <p:sp>
+        <p:nvSpPr>
+          <p:cNvPr id="100" name="TextBox 99">
+            <a:extLst>
+              <a:ext uri="{FF2B5EF4-FFF2-40B4-BE49-F238E27FC236}">
+                <a16:creationId xmlns:a16="http://schemas.microsoft.com/office/drawing/2014/main" id="{2DEA6E70-C042-4749-906B-64294C5C437E}"/>
+              </a:ext>
+            </a:extLst>
+          </p:cNvPr>
+          <p:cNvSpPr txBox="1"/>
+          <p:nvPr/>
+        </p:nvSpPr>
+        <p:spPr>
+          <a:xfrm>
+            <a:off x="5177984" y="2185798"/>
+            <a:ext cx="378630" cy="261610"/>
+          </a:xfrm>
+          <a:prstGeom prst="rect">
+            <a:avLst/>
+          </a:prstGeom>
+          <a:noFill/>
+        </p:spPr>
+        <p:txBody>
+          <a:bodyPr wrap="none" rtlCol="0">
+            <a:spAutoFit/>
+          </a:bodyPr>
+          <a:lstStyle/>
+          <a:p>
+            <a:r>
+              <a:rPr lang="en-SG" sz="1100" dirty="0"/>
+              <a:t>opt</a:t>
+            </a:r>
+            <a:endParaRPr lang="en-GB" sz="1100" dirty="0"/>
+          </a:p>
+        </p:txBody>
+      </p:sp>
+      <p:sp>
+        <p:nvSpPr>
+          <p:cNvPr id="101" name="TextBox 100">
+            <a:extLst>
+              <a:ext uri="{FF2B5EF4-FFF2-40B4-BE49-F238E27FC236}">
+                <a16:creationId xmlns:a16="http://schemas.microsoft.com/office/drawing/2014/main" id="{F664F9D5-E57D-4EB4-8487-7C0286B9A68D}"/>
+              </a:ext>
+            </a:extLst>
+          </p:cNvPr>
+          <p:cNvSpPr txBox="1"/>
+          <p:nvPr/>
+        </p:nvSpPr>
+        <p:spPr>
+          <a:xfrm>
+            <a:off x="4994906" y="2469100"/>
+            <a:ext cx="1365403" cy="153888"/>
+          </a:xfrm>
+          <a:prstGeom prst="rect">
+            <a:avLst/>
+          </a:prstGeom>
+          <a:noFill/>
+        </p:spPr>
+        <p:txBody>
+          <a:bodyPr wrap="square" lIns="0" tIns="0" rIns="0" bIns="0" rtlCol="0">
+            <a:spAutoFit/>
+          </a:bodyPr>
+          <a:lstStyle>
+            <a:defPPr>
+              <a:defRPr lang="en-US"/>
+            </a:defPPr>
+            <a:lvl1pPr algn="r">
+              <a:defRPr sz="1400">
+                <a:solidFill>
+                  <a:srgbClr val="0070C0"/>
+                </a:solidFill>
+              </a:defRPr>
+            </a:lvl1pPr>
+          </a:lstStyle>
+          <a:p>
+            <a:pPr algn="ctr"/>
+            <a:r>
+              <a:rPr lang="en-US" sz="1000" dirty="0">
+                <a:solidFill>
+                  <a:schemeClr val="tx1"/>
+                </a:solidFill>
+              </a:rPr>
+              <a:t>[</a:t>
+            </a:r>
+            <a:r>
+              <a:rPr lang="en-US" sz="1000" dirty="0" err="1">
+                <a:solidFill>
+                  <a:schemeClr val="tx1"/>
+                </a:solidFill>
+              </a:rPr>
+              <a:t>tempImage</a:t>
+            </a:r>
+            <a:r>
+              <a:rPr lang="en-US" sz="1000" dirty="0">
+                <a:solidFill>
+                  <a:schemeClr val="tx1"/>
+                </a:solidFill>
+              </a:rPr>
+              <a:t> exists]</a:t>
+            </a:r>
+          </a:p>
+        </p:txBody>
+      </p:sp>
     </p:spTree>
     <p:extLst>
       <p:ext uri="{BB962C8B-B14F-4D97-AF65-F5344CB8AC3E}">

</xml_diff>